<commit_message>
corrected label error sup figure 4
</commit_message>
<xml_diff>
--- a/figure-assembly/sup-figure-4.pptx
+++ b/figure-assembly/sup-figure-4.pptx
@@ -243,7 +243,7 @@
           <a:p>
             <a:fld id="{25EC0CD3-564D-9742-98B5-86271438CCE6}" type="datetimeFigureOut">
               <a:rPr lang="en-US" smtClean="0"/>
-              <a:t>11/13/18</a:t>
+              <a:t>11/14/18</a:t>
             </a:fld>
             <a:endParaRPr lang="en-US"/>
           </a:p>
@@ -413,7 +413,7 @@
           <a:p>
             <a:fld id="{25EC0CD3-564D-9742-98B5-86271438CCE6}" type="datetimeFigureOut">
               <a:rPr lang="en-US" smtClean="0"/>
-              <a:t>11/13/18</a:t>
+              <a:t>11/14/18</a:t>
             </a:fld>
             <a:endParaRPr lang="en-US"/>
           </a:p>
@@ -593,7 +593,7 @@
           <a:p>
             <a:fld id="{25EC0CD3-564D-9742-98B5-86271438CCE6}" type="datetimeFigureOut">
               <a:rPr lang="en-US" smtClean="0"/>
-              <a:t>11/13/18</a:t>
+              <a:t>11/14/18</a:t>
             </a:fld>
             <a:endParaRPr lang="en-US"/>
           </a:p>
@@ -763,7 +763,7 @@
           <a:p>
             <a:fld id="{25EC0CD3-564D-9742-98B5-86271438CCE6}" type="datetimeFigureOut">
               <a:rPr lang="en-US" smtClean="0"/>
-              <a:t>11/13/18</a:t>
+              <a:t>11/14/18</a:t>
             </a:fld>
             <a:endParaRPr lang="en-US"/>
           </a:p>
@@ -1007,7 +1007,7 @@
           <a:p>
             <a:fld id="{25EC0CD3-564D-9742-98B5-86271438CCE6}" type="datetimeFigureOut">
               <a:rPr lang="en-US" smtClean="0"/>
-              <a:t>11/13/18</a:t>
+              <a:t>11/14/18</a:t>
             </a:fld>
             <a:endParaRPr lang="en-US"/>
           </a:p>
@@ -1239,7 +1239,7 @@
           <a:p>
             <a:fld id="{25EC0CD3-564D-9742-98B5-86271438CCE6}" type="datetimeFigureOut">
               <a:rPr lang="en-US" smtClean="0"/>
-              <a:t>11/13/18</a:t>
+              <a:t>11/14/18</a:t>
             </a:fld>
             <a:endParaRPr lang="en-US"/>
           </a:p>
@@ -1606,7 +1606,7 @@
           <a:p>
             <a:fld id="{25EC0CD3-564D-9742-98B5-86271438CCE6}" type="datetimeFigureOut">
               <a:rPr lang="en-US" smtClean="0"/>
-              <a:t>11/13/18</a:t>
+              <a:t>11/14/18</a:t>
             </a:fld>
             <a:endParaRPr lang="en-US"/>
           </a:p>
@@ -1724,7 +1724,7 @@
           <a:p>
             <a:fld id="{25EC0CD3-564D-9742-98B5-86271438CCE6}" type="datetimeFigureOut">
               <a:rPr lang="en-US" smtClean="0"/>
-              <a:t>11/13/18</a:t>
+              <a:t>11/14/18</a:t>
             </a:fld>
             <a:endParaRPr lang="en-US"/>
           </a:p>
@@ -1819,7 +1819,7 @@
           <a:p>
             <a:fld id="{25EC0CD3-564D-9742-98B5-86271438CCE6}" type="datetimeFigureOut">
               <a:rPr lang="en-US" smtClean="0"/>
-              <a:t>11/13/18</a:t>
+              <a:t>11/14/18</a:t>
             </a:fld>
             <a:endParaRPr lang="en-US"/>
           </a:p>
@@ -2096,7 +2096,7 @@
           <a:p>
             <a:fld id="{25EC0CD3-564D-9742-98B5-86271438CCE6}" type="datetimeFigureOut">
               <a:rPr lang="en-US" smtClean="0"/>
-              <a:t>11/13/18</a:t>
+              <a:t>11/14/18</a:t>
             </a:fld>
             <a:endParaRPr lang="en-US"/>
           </a:p>
@@ -2353,7 +2353,7 @@
           <a:p>
             <a:fld id="{25EC0CD3-564D-9742-98B5-86271438CCE6}" type="datetimeFigureOut">
               <a:rPr lang="en-US" smtClean="0"/>
-              <a:t>11/13/18</a:t>
+              <a:t>11/14/18</a:t>
             </a:fld>
             <a:endParaRPr lang="en-US"/>
           </a:p>
@@ -2566,7 +2566,7 @@
           <a:p>
             <a:fld id="{25EC0CD3-564D-9742-98B5-86271438CCE6}" type="datetimeFigureOut">
               <a:rPr lang="en-US" smtClean="0"/>
-              <a:t>11/13/18</a:t>
+              <a:t>11/14/18</a:t>
             </a:fld>
             <a:endParaRPr lang="en-US"/>
           </a:p>
@@ -3045,10 +3045,10 @@
       </p:sp>
       <p:pic>
         <p:nvPicPr>
-          <p:cNvPr id="3" name="Picture 2">
+          <p:cNvPr id="4" name="Picture 3">
             <a:extLst>
               <a:ext uri="{FF2B5EF4-FFF2-40B4-BE49-F238E27FC236}">
-                <a16:creationId xmlns:a16="http://schemas.microsoft.com/office/drawing/2014/main" id="{FDA33BA3-6B41-DF41-B58D-9FA774289D72}"/>
+                <a16:creationId xmlns:a16="http://schemas.microsoft.com/office/drawing/2014/main" id="{7894C889-9C9D-914E-ACBC-398CB123D13F}"/>
               </a:ext>
             </a:extLst>
           </p:cNvPr>
@@ -3065,8 +3065,8 @@
         </p:blipFill>
         <p:spPr>
           <a:xfrm>
-            <a:off x="1751611" y="771670"/>
-            <a:ext cx="6271200" cy="5412132"/>
+            <a:off x="1680360" y="837897"/>
+            <a:ext cx="6120000" cy="5281644"/>
           </a:xfrm>
           <a:prstGeom prst="rect">
             <a:avLst/>

</xml_diff>

<commit_message>
more work sup fig 4
</commit_message>
<xml_diff>
--- a/figure-assembly/sup-figure-4.pptx
+++ b/figure-assembly/sup-figure-4.pptx
@@ -3075,6 +3075,42 @@
       </p:sp>
       <p:sp>
         <p:nvSpPr>
+          <p:cNvPr id="5" name="TextBox 4">
+            <a:extLst>
+              <a:ext uri="{FF2B5EF4-FFF2-40B4-BE49-F238E27FC236}">
+                <a16:creationId xmlns:a16="http://schemas.microsoft.com/office/drawing/2014/main" id="{D0B3CEFF-D287-F54F-8CDF-F34F949B28D9}"/>
+              </a:ext>
+            </a:extLst>
+          </p:cNvPr>
+          <p:cNvSpPr txBox="1"/>
+          <p:nvPr/>
+        </p:nvSpPr>
+        <p:spPr>
+          <a:xfrm>
+            <a:off x="1423357" y="3433264"/>
+            <a:ext cx="844952" cy="400110"/>
+          </a:xfrm>
+          <a:prstGeom prst="rect">
+            <a:avLst/>
+          </a:prstGeom>
+          <a:noFill/>
+        </p:spPr>
+        <p:txBody>
+          <a:bodyPr wrap="square" rtlCol="0">
+            <a:spAutoFit/>
+          </a:bodyPr>
+          <a:lstStyle/>
+          <a:p>
+            <a:pPr algn="ctr"/>
+            <a:r>
+              <a:rPr lang="en-US" sz="2000" dirty="0"/>
+              <a:t>C</a:t>
+            </a:r>
+          </a:p>
+        </p:txBody>
+      </p:sp>
+      <p:sp>
+        <p:nvSpPr>
           <p:cNvPr id="6" name="TextBox 5">
             <a:extLst>
               <a:ext uri="{FF2B5EF4-FFF2-40B4-BE49-F238E27FC236}">
@@ -3105,42 +3141,6 @@
             <a:r>
               <a:rPr lang="en-US" sz="2000" dirty="0"/>
               <a:t>D</a:t>
-            </a:r>
-          </a:p>
-        </p:txBody>
-      </p:sp>
-      <p:sp>
-        <p:nvSpPr>
-          <p:cNvPr id="5" name="TextBox 4">
-            <a:extLst>
-              <a:ext uri="{FF2B5EF4-FFF2-40B4-BE49-F238E27FC236}">
-                <a16:creationId xmlns:a16="http://schemas.microsoft.com/office/drawing/2014/main" id="{D0B3CEFF-D287-F54F-8CDF-F34F949B28D9}"/>
-              </a:ext>
-            </a:extLst>
-          </p:cNvPr>
-          <p:cNvSpPr txBox="1"/>
-          <p:nvPr/>
-        </p:nvSpPr>
-        <p:spPr>
-          <a:xfrm>
-            <a:off x="1423357" y="3433264"/>
-            <a:ext cx="844952" cy="400110"/>
-          </a:xfrm>
-          <a:prstGeom prst="rect">
-            <a:avLst/>
-          </a:prstGeom>
-          <a:noFill/>
-        </p:spPr>
-        <p:txBody>
-          <a:bodyPr wrap="square" rtlCol="0">
-            <a:spAutoFit/>
-          </a:bodyPr>
-          <a:lstStyle/>
-          <a:p>
-            <a:pPr algn="ctr"/>
-            <a:r>
-              <a:rPr lang="en-US" sz="2000" dirty="0"/>
-              <a:t>C</a:t>
             </a:r>
           </a:p>
         </p:txBody>

</xml_diff>